<commit_message>
alterado todos os arquivos
</commit_message>
<xml_diff>
--- a/apresentacao.pptx
+++ b/apresentacao.pptx
@@ -7,8 +7,6 @@
   <p:sldIdLst>
     <p:sldId id="256" r:id="rId2"/>
     <p:sldId id="257" r:id="rId3"/>
-    <p:sldId id="258" r:id="rId4"/>
-    <p:sldId id="259" r:id="rId5"/>
   </p:sldIdLst>
   <p:sldSz cx="12192000" cy="6858000"/>
   <p:notesSz cx="6858000" cy="9144000"/>
@@ -107,11 +105,6 @@
       </a:defRPr>
     </a:lvl9pPr>
   </p:defaultTextStyle>
-  <p:extLst>
-    <p:ext uri="{EFAFB233-063F-42B5-8137-9DF3F51BA10A}">
-      <p15:sldGuideLst xmlns:p15="http://schemas.microsoft.com/office/powerpoint/2012/main"/>
-    </p:ext>
-  </p:extLst>
 </p:presentation>
 </file>
 
@@ -3074,46 +3067,16 @@
           </a:prstGeom>
         </p:spPr>
       </p:pic>
-    </p:spTree>
-    <p:extLst>
-      <p:ext uri="{BB962C8B-B14F-4D97-AF65-F5344CB8AC3E}">
-        <p14:creationId xmlns:p14="http://schemas.microsoft.com/office/powerpoint/2010/main" val="2140268991"/>
-      </p:ext>
-    </p:extLst>
-  </p:cSld>
-  <p:clrMapOvr>
-    <a:masterClrMapping/>
-  </p:clrMapOvr>
-</p:sld>
-</file>
-
-<file path=ppt/slides/slide3.xml><?xml version="1.0" encoding="utf-8"?>
-<p:sld xmlns:a="http://schemas.openxmlformats.org/drawingml/2006/main" xmlns:r="http://schemas.openxmlformats.org/officeDocument/2006/relationships" xmlns:p="http://schemas.openxmlformats.org/presentationml/2006/main">
-  <p:cSld>
-    <p:spTree>
-      <p:nvGrpSpPr>
-        <p:cNvPr id="1" name=""/>
-        <p:cNvGrpSpPr/>
-        <p:nvPr/>
-      </p:nvGrpSpPr>
-      <p:grpSpPr>
-        <a:xfrm>
-          <a:off x="0" y="0"/>
-          <a:ext cx="0" cy="0"/>
-          <a:chOff x="0" y="0"/>
-          <a:chExt cx="0" cy="0"/>
-        </a:xfrm>
-      </p:grpSpPr>
       <p:pic>
         <p:nvPicPr>
-          <p:cNvPr id="4" name="Imagem 3"/>
+          <p:cNvPr id="5" name="Imagem 4"/>
           <p:cNvPicPr>
             <a:picLocks noChangeAspect="1"/>
           </p:cNvPicPr>
           <p:nvPr/>
         </p:nvPicPr>
         <p:blipFill>
-          <a:blip r:embed="rId2">
+          <a:blip r:embed="rId3">
             <a:extLst>
               <a:ext uri="{28A0092B-C50C-407E-A947-70E740481C1C}">
                 <a14:useLocalDpi xmlns:a14="http://schemas.microsoft.com/office/drawing/2010/main" val="0"/>
@@ -3126,8 +3089,8 @@
         </p:blipFill>
         <p:spPr>
           <a:xfrm>
-            <a:off x="6894548" y="-109182"/>
-            <a:ext cx="4244145" cy="6858000"/>
+            <a:off x="2709436" y="404812"/>
+            <a:ext cx="3743325" cy="6048375"/>
           </a:xfrm>
           <a:prstGeom prst="rect">
             <a:avLst/>
@@ -3137,68 +3100,7 @@
     </p:spTree>
     <p:extLst>
       <p:ext uri="{BB962C8B-B14F-4D97-AF65-F5344CB8AC3E}">
-        <p14:creationId xmlns:p14="http://schemas.microsoft.com/office/powerpoint/2010/main" val="957600759"/>
-      </p:ext>
-    </p:extLst>
-  </p:cSld>
-  <p:clrMapOvr>
-    <a:masterClrMapping/>
-  </p:clrMapOvr>
-</p:sld>
-</file>
-
-<file path=ppt/slides/slide4.xml><?xml version="1.0" encoding="utf-8"?>
-<p:sld xmlns:a="http://schemas.openxmlformats.org/drawingml/2006/main" xmlns:r="http://schemas.openxmlformats.org/officeDocument/2006/relationships" xmlns:p="http://schemas.openxmlformats.org/presentationml/2006/main">
-  <p:cSld>
-    <p:spTree>
-      <p:nvGrpSpPr>
-        <p:cNvPr id="1" name=""/>
-        <p:cNvGrpSpPr/>
-        <p:nvPr/>
-      </p:nvGrpSpPr>
-      <p:grpSpPr>
-        <a:xfrm>
-          <a:off x="0" y="0"/>
-          <a:ext cx="0" cy="0"/>
-          <a:chOff x="0" y="0"/>
-          <a:chExt cx="0" cy="0"/>
-        </a:xfrm>
-      </p:grpSpPr>
-      <p:sp>
-        <p:nvSpPr>
-          <p:cNvPr id="3" name="Título 1"/>
-          <p:cNvSpPr>
-            <a:spLocks noGrp="1"/>
-          </p:cNvSpPr>
-          <p:nvPr>
-            <p:ph type="ctrTitle"/>
-          </p:nvPr>
-        </p:nvSpPr>
-        <p:spPr>
-          <a:xfrm>
-            <a:off x="1524000" y="1122363"/>
-            <a:ext cx="9144000" cy="2387600"/>
-          </a:xfrm>
-        </p:spPr>
-        <p:txBody>
-          <a:bodyPr/>
-          <a:lstStyle/>
-          <a:p>
-            <a:r>
-              <a:rPr lang="pt-BR" smtClean="0"/>
-              <a:t>Arquivo 2</a:t>
-            </a:r>
-            <a:br>
-              <a:rPr lang="pt-BR" smtClean="0"/>
-            </a:br>
-            <a:endParaRPr lang="pt-BR" dirty="0"/>
-          </a:p>
-        </p:txBody>
-      </p:sp>
-    </p:spTree>
-    <p:extLst>
-      <p:ext uri="{BB962C8B-B14F-4D97-AF65-F5344CB8AC3E}">
-        <p14:creationId xmlns:p14="http://schemas.microsoft.com/office/powerpoint/2010/main" val="1399981216"/>
+        <p14:creationId xmlns:p14="http://schemas.microsoft.com/office/powerpoint/2010/main" val="2140268991"/>
       </p:ext>
     </p:extLst>
   </p:cSld>

</xml_diff>